<commit_message>
modified 115. Adding a Custom Environment
</commit_message>
<xml_diff>
--- a/115. Adding a Custom Environment.pptx
+++ b/115. Adding a Custom Environment.pptx
@@ -16,7 +16,6 @@
     <p:sldId id="264" r:id="rId10"/>
     <p:sldId id="266" r:id="rId11"/>
     <p:sldId id="267" r:id="rId12"/>
-    <p:sldId id="268" r:id="rId13"/>
   </p:sldIdLst>
   <p:sldSz cx="12192000" cy="6858000"/>
   <p:notesSz cx="6858000" cy="9144000"/>
@@ -3604,36 +3603,6 @@
 </p:sld>
 </file>
 
-<file path=ppt/slides/slide12.xml><?xml version="1.0" encoding="utf-8"?>
-<p:sld xmlns:a="http://schemas.openxmlformats.org/drawingml/2006/main" xmlns:r="http://schemas.openxmlformats.org/officeDocument/2006/relationships" xmlns:p="http://schemas.openxmlformats.org/presentationml/2006/main">
-  <p:cSld>
-    <p:spTree>
-      <p:nvGrpSpPr>
-        <p:cNvPr id="1" name=""/>
-        <p:cNvGrpSpPr/>
-        <p:nvPr/>
-      </p:nvGrpSpPr>
-      <p:grpSpPr>
-        <a:xfrm>
-          <a:off x="0" y="0"/>
-          <a:ext cx="0" cy="0"/>
-          <a:chOff x="0" y="0"/>
-          <a:chExt cx="0" cy="0"/>
-        </a:xfrm>
-      </p:grpSpPr>
-    </p:spTree>
-    <p:extLst>
-      <p:ext uri="{BB962C8B-B14F-4D97-AF65-F5344CB8AC3E}">
-        <p14:creationId xmlns:p14="http://schemas.microsoft.com/office/powerpoint/2010/main" val="1688573678"/>
-      </p:ext>
-    </p:extLst>
-  </p:cSld>
-  <p:clrMapOvr>
-    <a:masterClrMapping/>
-  </p:clrMapOvr>
-</p:sld>
-</file>
-
 <file path=ppt/slides/slide2.xml><?xml version="1.0" encoding="utf-8"?>
 <p:sld xmlns:a="http://schemas.openxmlformats.org/drawingml/2006/main" xmlns:r="http://schemas.openxmlformats.org/officeDocument/2006/relationships" xmlns:p="http://schemas.openxmlformats.org/presentationml/2006/main">
   <p:cSld>

</xml_diff>